<commit_message>
ajout ficiher travail severine
ajout 1
</commit_message>
<xml_diff>
--- a/Problématique.pptx
+++ b/Problématique.pptx
@@ -301,7 +301,7 @@
           </a:lstStyle>
           <a:p>
             <a:r>
-              <a:rPr lang="fr-FR" smtClean="0"/>
+              <a:rPr lang="fr-FR"/>
               <a:t>Modifiez le style du titre</a:t>
             </a:r>
             <a:endParaRPr lang="en-US" dirty="0"/>
@@ -421,7 +421,7 @@
           </a:lstStyle>
           <a:p>
             <a:r>
-              <a:rPr lang="fr-FR" smtClean="0"/>
+              <a:rPr lang="fr-FR"/>
               <a:t>Modifier le style des sous-titres du masque</a:t>
             </a:r>
             <a:endParaRPr lang="en-US" dirty="0"/>
@@ -461,7 +461,7 @@
             <a:fld id="{5923F103-BC34-4FE4-A40E-EDDEECFDA5D0}" type="datetimeFigureOut">
               <a:rPr lang="en-US" dirty="0"/>
               <a:pPr/>
-              <a:t>11/25/2022</a:t>
+              <a:t>11/26/2022</a:t>
             </a:fld>
             <a:endParaRPr lang="en-US" dirty="0"/>
           </a:p>
@@ -560,7 +560,7 @@
             <a:fld id="{D57F1E4F-1CFF-5643-939E-217C01CDF565}" type="slidenum">
               <a:rPr lang="en-US" dirty="0"/>
               <a:pPr/>
-              <a:t>‹N°›</a:t>
+              <a:t>‹#›</a:t>
             </a:fld>
             <a:endParaRPr lang="en-US" dirty="0"/>
           </a:p>
@@ -1368,7 +1368,7 @@
           </a:lstStyle>
           <a:p>
             <a:r>
-              <a:rPr lang="fr-FR" smtClean="0"/>
+              <a:rPr lang="fr-FR"/>
               <a:t>Modifiez le style du titre</a:t>
             </a:r>
             <a:endParaRPr lang="en-US" dirty="0"/>
@@ -1447,7 +1447,7 @@
           </a:lstStyle>
           <a:p>
             <a:r>
-              <a:rPr lang="fr-FR" smtClean="0"/>
+              <a:rPr lang="fr-FR"/>
               <a:t>Cliquez sur l'icône pour ajouter une image</a:t>
             </a:r>
             <a:endParaRPr lang="en-US" dirty="0"/>
@@ -1522,7 +1522,7 @@
           <a:p>
             <a:pPr lvl="0"/>
             <a:r>
-              <a:rPr lang="fr-FR" smtClean="0"/>
+              <a:rPr lang="fr-FR"/>
               <a:t>Modifier les styles du texte du masque</a:t>
             </a:r>
           </a:p>
@@ -1545,7 +1545,7 @@
           <a:p>
             <a:fld id="{923A1CC3-2375-41D4-9E03-427CAF2A4C1A}" type="datetimeFigureOut">
               <a:rPr lang="en-US" dirty="0"/>
-              <a:t>11/25/2022</a:t>
+              <a:t>11/26/2022</a:t>
             </a:fld>
             <a:endParaRPr lang="en-US" dirty="0"/>
           </a:p>
@@ -1624,7 +1624,7 @@
             <a:fld id="{D57F1E4F-1CFF-5643-939E-217C01CDF565}" type="slidenum">
               <a:rPr lang="en-US" dirty="0"/>
               <a:pPr/>
-              <a:t>‹N°›</a:t>
+              <a:t>‹#›</a:t>
             </a:fld>
             <a:endParaRPr lang="en-US" dirty="0"/>
           </a:p>
@@ -2430,7 +2430,7 @@
           </a:lstStyle>
           <a:p>
             <a:r>
-              <a:rPr lang="fr-FR" smtClean="0"/>
+              <a:rPr lang="fr-FR"/>
               <a:t>Modifiez le style du titre</a:t>
             </a:r>
             <a:endParaRPr lang="en-US" dirty="0"/>
@@ -2498,7 +2498,7 @@
           <a:p>
             <a:pPr lvl="0"/>
             <a:r>
-              <a:rPr lang="fr-FR" smtClean="0"/>
+              <a:rPr lang="fr-FR"/>
               <a:t>Modifier les styles du texte du masque</a:t>
             </a:r>
           </a:p>
@@ -2521,7 +2521,7 @@
           <a:p>
             <a:fld id="{AFF16868-8199-4C2C-A5B1-63AEE139F88E}" type="datetimeFigureOut">
               <a:rPr lang="en-US" dirty="0"/>
-              <a:t>11/25/2022</a:t>
+              <a:t>11/26/2022</a:t>
             </a:fld>
             <a:endParaRPr lang="en-US" dirty="0"/>
           </a:p>
@@ -2600,7 +2600,7 @@
             <a:fld id="{D57F1E4F-1CFF-5643-939E-217C01CDF565}" type="slidenum">
               <a:rPr lang="en-US" dirty="0"/>
               <a:pPr/>
-              <a:t>‹N°›</a:t>
+              <a:t>‹#›</a:t>
             </a:fld>
             <a:endParaRPr lang="en-US" dirty="0"/>
           </a:p>
@@ -3484,7 +3484,7 @@
           </a:lstStyle>
           <a:p>
             <a:r>
-              <a:rPr lang="fr-FR" smtClean="0"/>
+              <a:rPr lang="fr-FR"/>
               <a:t>Modifiez le style du titre</a:t>
             </a:r>
             <a:endParaRPr lang="en-US" dirty="0"/>
@@ -3561,7 +3561,7 @@
           <a:p>
             <a:pPr lvl="0"/>
             <a:r>
-              <a:rPr lang="fr-FR" smtClean="0"/>
+              <a:rPr lang="fr-FR"/>
               <a:t>Modifier les styles du texte du masque</a:t>
             </a:r>
           </a:p>
@@ -3628,7 +3628,7 @@
           <a:p>
             <a:pPr lvl="0"/>
             <a:r>
-              <a:rPr lang="fr-FR" smtClean="0"/>
+              <a:rPr lang="fr-FR"/>
               <a:t>Modifier les styles du texte du masque</a:t>
             </a:r>
           </a:p>
@@ -3651,7 +3651,7 @@
           <a:p>
             <a:fld id="{AAD9FF7F-6988-44CC-821B-644E70CD2F73}" type="datetimeFigureOut">
               <a:rPr lang="en-US" dirty="0"/>
-              <a:t>11/25/2022</a:t>
+              <a:t>11/26/2022</a:t>
             </a:fld>
             <a:endParaRPr lang="en-US" dirty="0"/>
           </a:p>
@@ -3730,7 +3730,7 @@
             <a:fld id="{D57F1E4F-1CFF-5643-939E-217C01CDF565}" type="slidenum">
               <a:rPr lang="en-US" dirty="0"/>
               <a:pPr/>
-              <a:t>‹N°›</a:t>
+              <a:t>‹#›</a:t>
             </a:fld>
             <a:endParaRPr lang="en-US" dirty="0"/>
           </a:p>
@@ -4536,7 +4536,7 @@
           </a:lstStyle>
           <a:p>
             <a:r>
-              <a:rPr lang="fr-FR" smtClean="0"/>
+              <a:rPr lang="fr-FR"/>
               <a:t>Modifiez le style du titre</a:t>
             </a:r>
             <a:endParaRPr lang="en-US" dirty="0"/>
@@ -4657,7 +4657,7 @@
           <a:p>
             <a:pPr lvl="0"/>
             <a:r>
-              <a:rPr lang="fr-FR" smtClean="0"/>
+              <a:rPr lang="fr-FR"/>
               <a:t>Modifier les styles du texte du masque</a:t>
             </a:r>
           </a:p>
@@ -4680,7 +4680,7 @@
           <a:p>
             <a:fld id="{5C12C299-16B2-4475-990D-751901EACC14}" type="datetimeFigureOut">
               <a:rPr lang="en-US" dirty="0"/>
-              <a:t>11/25/2022</a:t>
+              <a:t>11/26/2022</a:t>
             </a:fld>
             <a:endParaRPr lang="en-US" dirty="0"/>
           </a:p>
@@ -4759,7 +4759,7 @@
             <a:fld id="{D57F1E4F-1CFF-5643-939E-217C01CDF565}" type="slidenum">
               <a:rPr lang="en-US" dirty="0"/>
               <a:pPr/>
-              <a:t>‹N°›</a:t>
+              <a:t>‹#›</a:t>
             </a:fld>
             <a:endParaRPr lang="en-US" dirty="0"/>
           </a:p>
@@ -4815,7 +4815,7 @@
           </a:lstStyle>
           <a:p>
             <a:r>
-              <a:rPr lang="fr-FR" smtClean="0"/>
+              <a:rPr lang="fr-FR"/>
               <a:t>Modifiez le style du titre</a:t>
             </a:r>
             <a:endParaRPr lang="en-US" dirty="0"/>
@@ -4890,7 +4890,7 @@
           <a:p>
             <a:pPr lvl="0"/>
             <a:r>
-              <a:rPr lang="fr-FR" smtClean="0"/>
+              <a:rPr lang="fr-FR"/>
               <a:t>Modifier les styles du texte du masque</a:t>
             </a:r>
           </a:p>
@@ -4957,7 +4957,7 @@
           <a:p>
             <a:pPr lvl="0"/>
             <a:r>
-              <a:rPr lang="fr-FR" smtClean="0"/>
+              <a:rPr lang="fr-FR"/>
               <a:t>Modifier les styles du texte du masque</a:t>
             </a:r>
           </a:p>
@@ -5031,7 +5031,7 @@
           <a:p>
             <a:pPr lvl="0"/>
             <a:r>
-              <a:rPr lang="fr-FR" smtClean="0"/>
+              <a:rPr lang="fr-FR"/>
               <a:t>Modifier les styles du texte du masque</a:t>
             </a:r>
           </a:p>
@@ -5098,7 +5098,7 @@
           <a:p>
             <a:pPr lvl="0"/>
             <a:r>
-              <a:rPr lang="fr-FR" smtClean="0"/>
+              <a:rPr lang="fr-FR"/>
               <a:t>Modifier les styles du texte du masque</a:t>
             </a:r>
           </a:p>
@@ -5172,7 +5172,7 @@
           <a:p>
             <a:pPr lvl="0"/>
             <a:r>
-              <a:rPr lang="fr-FR" smtClean="0"/>
+              <a:rPr lang="fr-FR"/>
               <a:t>Modifier les styles du texte du masque</a:t>
             </a:r>
           </a:p>
@@ -5239,7 +5239,7 @@
           <a:p>
             <a:pPr lvl="0"/>
             <a:r>
-              <a:rPr lang="fr-FR" smtClean="0"/>
+              <a:rPr lang="fr-FR"/>
               <a:t>Modifier les styles du texte du masque</a:t>
             </a:r>
           </a:p>
@@ -5336,7 +5336,7 @@
           <a:p>
             <a:fld id="{9FE86839-B9D8-4651-8783-F325ECE74E65}" type="datetimeFigureOut">
               <a:rPr lang="en-US" dirty="0"/>
-              <a:t>11/25/2022</a:t>
+              <a:t>11/26/2022</a:t>
             </a:fld>
             <a:endParaRPr lang="en-US" dirty="0"/>
           </a:p>
@@ -5379,7 +5379,7 @@
             <a:fld id="{D57F1E4F-1CFF-5643-939E-217C01CDF565}" type="slidenum">
               <a:rPr lang="en-US" dirty="0"/>
               <a:pPr/>
-              <a:t>‹N°›</a:t>
+              <a:t>‹#›</a:t>
             </a:fld>
             <a:endParaRPr lang="en-US" dirty="0"/>
           </a:p>
@@ -5435,7 +5435,7 @@
           </a:lstStyle>
           <a:p>
             <a:r>
-              <a:rPr lang="fr-FR" smtClean="0"/>
+              <a:rPr lang="fr-FR"/>
               <a:t>Modifiez le style du titre</a:t>
             </a:r>
             <a:endParaRPr lang="en-US" dirty="0"/>
@@ -5510,7 +5510,7 @@
           <a:p>
             <a:pPr lvl="0"/>
             <a:r>
-              <a:rPr lang="fr-FR" smtClean="0"/>
+              <a:rPr lang="fr-FR"/>
               <a:t>Modifier les styles du texte du masque</a:t>
             </a:r>
           </a:p>
@@ -5588,7 +5588,7 @@
           </a:lstStyle>
           <a:p>
             <a:r>
-              <a:rPr lang="fr-FR" smtClean="0"/>
+              <a:rPr lang="fr-FR"/>
               <a:t>Cliquez sur l'icône pour ajouter une image</a:t>
             </a:r>
             <a:endParaRPr lang="en-US" dirty="0"/>
@@ -5656,7 +5656,7 @@
           <a:p>
             <a:pPr lvl="0"/>
             <a:r>
-              <a:rPr lang="fr-FR" smtClean="0"/>
+              <a:rPr lang="fr-FR"/>
               <a:t>Modifier les styles du texte du masque</a:t>
             </a:r>
           </a:p>
@@ -5730,7 +5730,7 @@
           <a:p>
             <a:pPr lvl="0"/>
             <a:r>
-              <a:rPr lang="fr-FR" smtClean="0"/>
+              <a:rPr lang="fr-FR"/>
               <a:t>Modifier les styles du texte du masque</a:t>
             </a:r>
           </a:p>
@@ -5808,7 +5808,7 @@
           </a:lstStyle>
           <a:p>
             <a:r>
-              <a:rPr lang="fr-FR" smtClean="0"/>
+              <a:rPr lang="fr-FR"/>
               <a:t>Cliquez sur l'icône pour ajouter une image</a:t>
             </a:r>
             <a:endParaRPr lang="en-US" dirty="0"/>
@@ -5876,7 +5876,7 @@
           <a:p>
             <a:pPr lvl="0"/>
             <a:r>
-              <a:rPr lang="fr-FR" smtClean="0"/>
+              <a:rPr lang="fr-FR"/>
               <a:t>Modifier les styles du texte du masque</a:t>
             </a:r>
           </a:p>
@@ -5950,7 +5950,7 @@
           <a:p>
             <a:pPr lvl="0"/>
             <a:r>
-              <a:rPr lang="fr-FR" smtClean="0"/>
+              <a:rPr lang="fr-FR"/>
               <a:t>Modifier les styles du texte du masque</a:t>
             </a:r>
           </a:p>
@@ -6028,7 +6028,7 @@
           </a:lstStyle>
           <a:p>
             <a:r>
-              <a:rPr lang="fr-FR" smtClean="0"/>
+              <a:rPr lang="fr-FR"/>
               <a:t>Cliquez sur l'icône pour ajouter une image</a:t>
             </a:r>
             <a:endParaRPr lang="en-US" dirty="0"/>
@@ -6096,7 +6096,7 @@
           <a:p>
             <a:pPr lvl="0"/>
             <a:r>
-              <a:rPr lang="fr-FR" smtClean="0"/>
+              <a:rPr lang="fr-FR"/>
               <a:t>Modifier les styles du texte du masque</a:t>
             </a:r>
           </a:p>
@@ -6193,7 +6193,7 @@
           <a:p>
             <a:fld id="{FD484F64-32F6-45C5-931F-ADC1662401D0}" type="datetimeFigureOut">
               <a:rPr lang="en-US" dirty="0"/>
-              <a:t>11/25/2022</a:t>
+              <a:t>11/26/2022</a:t>
             </a:fld>
             <a:endParaRPr lang="en-US" dirty="0"/>
           </a:p>
@@ -6241,7 +6241,7 @@
             <a:fld id="{D57F1E4F-1CFF-5643-939E-217C01CDF565}" type="slidenum">
               <a:rPr lang="en-US" dirty="0"/>
               <a:pPr/>
-              <a:t>‹N°›</a:t>
+              <a:t>‹#›</a:t>
             </a:fld>
             <a:endParaRPr lang="en-US" dirty="0"/>
           </a:p>
@@ -6293,7 +6293,7 @@
           <a:lstStyle/>
           <a:p>
             <a:r>
-              <a:rPr lang="fr-FR" smtClean="0"/>
+              <a:rPr lang="fr-FR"/>
               <a:t>Modifiez le style du titre</a:t>
             </a:r>
             <a:endParaRPr lang="en-US" dirty="0"/>
@@ -6322,35 +6322,35 @@
           <a:p>
             <a:pPr lvl="0"/>
             <a:r>
-              <a:rPr lang="fr-FR" smtClean="0"/>
+              <a:rPr lang="fr-FR"/>
               <a:t>Modifier les styles du texte du masque</a:t>
             </a:r>
           </a:p>
           <a:p>
             <a:pPr lvl="1"/>
             <a:r>
-              <a:rPr lang="fr-FR" smtClean="0"/>
+              <a:rPr lang="fr-FR"/>
               <a:t>Deuxième niveau</a:t>
             </a:r>
           </a:p>
           <a:p>
             <a:pPr lvl="2"/>
             <a:r>
-              <a:rPr lang="fr-FR" smtClean="0"/>
+              <a:rPr lang="fr-FR"/>
               <a:t>Troisième niveau</a:t>
             </a:r>
           </a:p>
           <a:p>
             <a:pPr lvl="3"/>
             <a:r>
-              <a:rPr lang="fr-FR" smtClean="0"/>
+              <a:rPr lang="fr-FR"/>
               <a:t>Quatrième niveau</a:t>
             </a:r>
           </a:p>
           <a:p>
             <a:pPr lvl="4"/>
             <a:r>
-              <a:rPr lang="fr-FR" smtClean="0"/>
+              <a:rPr lang="fr-FR"/>
               <a:t>Cinquième niveau</a:t>
             </a:r>
             <a:endParaRPr lang="en-US" dirty="0"/>
@@ -6379,7 +6379,7 @@
           <a:p>
             <a:fld id="{53086D93-FCAC-47E0-A2EE-787E62CA814C}" type="datetimeFigureOut">
               <a:rPr lang="en-US" dirty="0"/>
-              <a:t>11/25/2022</a:t>
+              <a:t>11/26/2022</a:t>
             </a:fld>
             <a:endParaRPr lang="en-US" dirty="0"/>
           </a:p>
@@ -6422,7 +6422,7 @@
             <a:fld id="{D57F1E4F-1CFF-5643-939E-217C01CDF565}" type="slidenum">
               <a:rPr lang="en-US" dirty="0"/>
               <a:pPr/>
-              <a:t>‹N°›</a:t>
+              <a:t>‹#›</a:t>
             </a:fld>
             <a:endParaRPr lang="en-US" dirty="0"/>
           </a:p>
@@ -7261,7 +7261,7 @@
           <a:lstStyle/>
           <a:p>
             <a:r>
-              <a:rPr lang="fr-FR" smtClean="0"/>
+              <a:rPr lang="fr-FR"/>
               <a:t>Modifiez le style du titre</a:t>
             </a:r>
             <a:endParaRPr lang="en-US" dirty="0"/>
@@ -7290,35 +7290,35 @@
           <a:p>
             <a:pPr lvl="0"/>
             <a:r>
-              <a:rPr lang="fr-FR" smtClean="0"/>
+              <a:rPr lang="fr-FR"/>
               <a:t>Modifier les styles du texte du masque</a:t>
             </a:r>
           </a:p>
           <a:p>
             <a:pPr lvl="1"/>
             <a:r>
-              <a:rPr lang="fr-FR" smtClean="0"/>
+              <a:rPr lang="fr-FR"/>
               <a:t>Deuxième niveau</a:t>
             </a:r>
           </a:p>
           <a:p>
             <a:pPr lvl="2"/>
             <a:r>
-              <a:rPr lang="fr-FR" smtClean="0"/>
+              <a:rPr lang="fr-FR"/>
               <a:t>Troisième niveau</a:t>
             </a:r>
           </a:p>
           <a:p>
             <a:pPr lvl="3"/>
             <a:r>
-              <a:rPr lang="fr-FR" smtClean="0"/>
+              <a:rPr lang="fr-FR"/>
               <a:t>Quatrième niveau</a:t>
             </a:r>
           </a:p>
           <a:p>
             <a:pPr lvl="4"/>
             <a:r>
-              <a:rPr lang="fr-FR" smtClean="0"/>
+              <a:rPr lang="fr-FR"/>
               <a:t>Cinquième niveau</a:t>
             </a:r>
             <a:endParaRPr lang="en-US" dirty="0"/>
@@ -7347,7 +7347,7 @@
           <a:p>
             <a:fld id="{CDA879A6-0FD0-4734-A311-86BFCA472E6E}" type="datetimeFigureOut">
               <a:rPr lang="en-US" dirty="0"/>
-              <a:t>11/25/2022</a:t>
+              <a:t>11/26/2022</a:t>
             </a:fld>
             <a:endParaRPr lang="en-US" dirty="0"/>
           </a:p>
@@ -7426,7 +7426,7 @@
             <a:fld id="{D57F1E4F-1CFF-5643-939E-217C01CDF565}" type="slidenum">
               <a:rPr lang="en-US" dirty="0"/>
               <a:pPr/>
-              <a:t>‹N°›</a:t>
+              <a:t>‹#›</a:t>
             </a:fld>
             <a:endParaRPr lang="en-US" dirty="0"/>
           </a:p>
@@ -7473,7 +7473,7 @@
           <a:lstStyle/>
           <a:p>
             <a:r>
-              <a:rPr lang="fr-FR" smtClean="0"/>
+              <a:rPr lang="fr-FR"/>
               <a:t>Modifiez le style du titre</a:t>
             </a:r>
             <a:endParaRPr lang="en-US" dirty="0"/>
@@ -7502,35 +7502,35 @@
           <a:p>
             <a:pPr lvl="0"/>
             <a:r>
-              <a:rPr lang="fr-FR" smtClean="0"/>
+              <a:rPr lang="fr-FR"/>
               <a:t>Modifier les styles du texte du masque</a:t>
             </a:r>
           </a:p>
           <a:p>
             <a:pPr lvl="1"/>
             <a:r>
-              <a:rPr lang="fr-FR" smtClean="0"/>
+              <a:rPr lang="fr-FR"/>
               <a:t>Deuxième niveau</a:t>
             </a:r>
           </a:p>
           <a:p>
             <a:pPr lvl="2"/>
             <a:r>
-              <a:rPr lang="fr-FR" smtClean="0"/>
+              <a:rPr lang="fr-FR"/>
               <a:t>Troisième niveau</a:t>
             </a:r>
           </a:p>
           <a:p>
             <a:pPr lvl="3"/>
             <a:r>
-              <a:rPr lang="fr-FR" smtClean="0"/>
+              <a:rPr lang="fr-FR"/>
               <a:t>Quatrième niveau</a:t>
             </a:r>
           </a:p>
           <a:p>
             <a:pPr lvl="4"/>
             <a:r>
-              <a:rPr lang="fr-FR" smtClean="0"/>
+              <a:rPr lang="fr-FR"/>
               <a:t>Cinquième niveau</a:t>
             </a:r>
             <a:endParaRPr lang="en-US" dirty="0"/>
@@ -7554,7 +7554,7 @@
           <a:p>
             <a:fld id="{19C9CA7B-DFD4-44B5-8C60-D14B8CD1FB59}" type="datetimeFigureOut">
               <a:rPr lang="en-US" dirty="0"/>
-              <a:t>11/25/2022</a:t>
+              <a:t>11/26/2022</a:t>
             </a:fld>
             <a:endParaRPr lang="en-US" dirty="0"/>
           </a:p>
@@ -7597,7 +7597,7 @@
             <a:fld id="{D57F1E4F-1CFF-5643-939E-217C01CDF565}" type="slidenum">
               <a:rPr lang="en-US" dirty="0"/>
               <a:pPr/>
-              <a:t>‹N°›</a:t>
+              <a:t>‹#›</a:t>
             </a:fld>
             <a:endParaRPr lang="en-US" dirty="0"/>
           </a:p>
@@ -8440,7 +8440,7 @@
           </a:lstStyle>
           <a:p>
             <a:r>
-              <a:rPr lang="fr-FR" smtClean="0"/>
+              <a:rPr lang="fr-FR"/>
               <a:t>Modifiez le style du titre</a:t>
             </a:r>
             <a:endParaRPr lang="en-US" dirty="0"/>
@@ -8561,7 +8561,7 @@
           <a:p>
             <a:pPr lvl="0"/>
             <a:r>
-              <a:rPr lang="fr-FR" smtClean="0"/>
+              <a:rPr lang="fr-FR"/>
               <a:t>Modifier les styles du texte du masque</a:t>
             </a:r>
           </a:p>
@@ -8584,7 +8584,7 @@
           <a:p>
             <a:fld id="{F34E6425-0181-43F2-84FC-787E803FD2F8}" type="datetimeFigureOut">
               <a:rPr lang="en-US" dirty="0"/>
-              <a:t>11/25/2022</a:t>
+              <a:t>11/26/2022</a:t>
             </a:fld>
             <a:endParaRPr lang="en-US" dirty="0"/>
           </a:p>
@@ -8663,7 +8663,7 @@
             <a:fld id="{D57F1E4F-1CFF-5643-939E-217C01CDF565}" type="slidenum">
               <a:rPr lang="en-US" dirty="0"/>
               <a:pPr/>
-              <a:t>‹N°›</a:t>
+              <a:t>‹#›</a:t>
             </a:fld>
             <a:endParaRPr lang="en-US" dirty="0"/>
           </a:p>
@@ -8710,7 +8710,7 @@
           <a:lstStyle/>
           <a:p>
             <a:r>
-              <a:rPr lang="fr-FR" smtClean="0"/>
+              <a:rPr lang="fr-FR"/>
               <a:t>Modifiez le style du titre</a:t>
             </a:r>
             <a:endParaRPr lang="en-US" dirty="0"/>
@@ -8741,35 +8741,35 @@
           <a:p>
             <a:pPr lvl="0"/>
             <a:r>
-              <a:rPr lang="fr-FR" smtClean="0"/>
+              <a:rPr lang="fr-FR"/>
               <a:t>Modifier les styles du texte du masque</a:t>
             </a:r>
           </a:p>
           <a:p>
             <a:pPr lvl="1"/>
             <a:r>
-              <a:rPr lang="fr-FR" smtClean="0"/>
+              <a:rPr lang="fr-FR"/>
               <a:t>Deuxième niveau</a:t>
             </a:r>
           </a:p>
           <a:p>
             <a:pPr lvl="2"/>
             <a:r>
-              <a:rPr lang="fr-FR" smtClean="0"/>
+              <a:rPr lang="fr-FR"/>
               <a:t>Troisième niveau</a:t>
             </a:r>
           </a:p>
           <a:p>
             <a:pPr lvl="3"/>
             <a:r>
-              <a:rPr lang="fr-FR" smtClean="0"/>
+              <a:rPr lang="fr-FR"/>
               <a:t>Quatrième niveau</a:t>
             </a:r>
           </a:p>
           <a:p>
             <a:pPr lvl="4"/>
             <a:r>
-              <a:rPr lang="fr-FR" smtClean="0"/>
+              <a:rPr lang="fr-FR"/>
               <a:t>Cinquième niveau</a:t>
             </a:r>
             <a:endParaRPr lang="en-US" dirty="0"/>
@@ -8800,35 +8800,35 @@
           <a:p>
             <a:pPr lvl="0"/>
             <a:r>
-              <a:rPr lang="fr-FR" smtClean="0"/>
+              <a:rPr lang="fr-FR"/>
               <a:t>Modifier les styles du texte du masque</a:t>
             </a:r>
           </a:p>
           <a:p>
             <a:pPr lvl="1"/>
             <a:r>
-              <a:rPr lang="fr-FR" smtClean="0"/>
+              <a:rPr lang="fr-FR"/>
               <a:t>Deuxième niveau</a:t>
             </a:r>
           </a:p>
           <a:p>
             <a:pPr lvl="2"/>
             <a:r>
-              <a:rPr lang="fr-FR" smtClean="0"/>
+              <a:rPr lang="fr-FR"/>
               <a:t>Troisième niveau</a:t>
             </a:r>
           </a:p>
           <a:p>
             <a:pPr lvl="3"/>
             <a:r>
-              <a:rPr lang="fr-FR" smtClean="0"/>
+              <a:rPr lang="fr-FR"/>
               <a:t>Quatrième niveau</a:t>
             </a:r>
           </a:p>
           <a:p>
             <a:pPr lvl="4"/>
             <a:r>
-              <a:rPr lang="fr-FR" smtClean="0"/>
+              <a:rPr lang="fr-FR"/>
               <a:t>Cinquième niveau</a:t>
             </a:r>
             <a:endParaRPr lang="en-US" dirty="0"/>
@@ -8852,7 +8852,7 @@
           <a:p>
             <a:fld id="{3BDB8791-F1B0-41E7-B7FD-A781E65C4266}" type="datetimeFigureOut">
               <a:rPr lang="en-US" dirty="0"/>
-              <a:t>11/25/2022</a:t>
+              <a:t>11/26/2022</a:t>
             </a:fld>
             <a:endParaRPr lang="en-US" dirty="0"/>
           </a:p>
@@ -8895,7 +8895,7 @@
             <a:fld id="{D57F1E4F-1CFF-5643-939E-217C01CDF565}" type="slidenum">
               <a:rPr lang="en-US" dirty="0"/>
               <a:pPr/>
-              <a:t>‹N°›</a:t>
+              <a:t>‹#›</a:t>
             </a:fld>
             <a:endParaRPr lang="en-US" dirty="0"/>
           </a:p>
@@ -8946,7 +8946,7 @@
           </a:lstStyle>
           <a:p>
             <a:r>
-              <a:rPr lang="fr-FR" smtClean="0"/>
+              <a:rPr lang="fr-FR"/>
               <a:t>Modifiez le style du titre</a:t>
             </a:r>
             <a:endParaRPr lang="en-US" dirty="0"/>
@@ -9018,7 +9018,7 @@
           <a:p>
             <a:pPr lvl="0"/>
             <a:r>
-              <a:rPr lang="fr-FR" smtClean="0"/>
+              <a:rPr lang="fr-FR"/>
               <a:t>Modifier les styles du texte du masque</a:t>
             </a:r>
           </a:p>
@@ -9048,35 +9048,35 @@
           <a:p>
             <a:pPr lvl="0"/>
             <a:r>
-              <a:rPr lang="fr-FR" smtClean="0"/>
+              <a:rPr lang="fr-FR"/>
               <a:t>Modifier les styles du texte du masque</a:t>
             </a:r>
           </a:p>
           <a:p>
             <a:pPr lvl="1"/>
             <a:r>
-              <a:rPr lang="fr-FR" smtClean="0"/>
+              <a:rPr lang="fr-FR"/>
               <a:t>Deuxième niveau</a:t>
             </a:r>
           </a:p>
           <a:p>
             <a:pPr lvl="2"/>
             <a:r>
-              <a:rPr lang="fr-FR" smtClean="0"/>
+              <a:rPr lang="fr-FR"/>
               <a:t>Troisième niveau</a:t>
             </a:r>
           </a:p>
           <a:p>
             <a:pPr lvl="3"/>
             <a:r>
-              <a:rPr lang="fr-FR" smtClean="0"/>
+              <a:rPr lang="fr-FR"/>
               <a:t>Quatrième niveau</a:t>
             </a:r>
           </a:p>
           <a:p>
             <a:pPr lvl="4"/>
             <a:r>
-              <a:rPr lang="fr-FR" smtClean="0"/>
+              <a:rPr lang="fr-FR"/>
               <a:t>Cinquième niveau</a:t>
             </a:r>
             <a:endParaRPr lang="en-US" dirty="0"/>
@@ -9148,7 +9148,7 @@
           <a:p>
             <a:pPr lvl="0"/>
             <a:r>
-              <a:rPr lang="fr-FR" smtClean="0"/>
+              <a:rPr lang="fr-FR"/>
               <a:t>Modifier les styles du texte du masque</a:t>
             </a:r>
           </a:p>
@@ -9206,35 +9206,35 @@
           <a:p>
             <a:pPr lvl="0"/>
             <a:r>
-              <a:rPr lang="fr-FR" smtClean="0"/>
+              <a:rPr lang="fr-FR"/>
               <a:t>Modifier les styles du texte du masque</a:t>
             </a:r>
           </a:p>
           <a:p>
             <a:pPr lvl="1"/>
             <a:r>
-              <a:rPr lang="fr-FR" smtClean="0"/>
+              <a:rPr lang="fr-FR"/>
               <a:t>Deuxième niveau</a:t>
             </a:r>
           </a:p>
           <a:p>
             <a:pPr lvl="2"/>
             <a:r>
-              <a:rPr lang="fr-FR" smtClean="0"/>
+              <a:rPr lang="fr-FR"/>
               <a:t>Troisième niveau</a:t>
             </a:r>
           </a:p>
           <a:p>
             <a:pPr lvl="3"/>
             <a:r>
-              <a:rPr lang="fr-FR" smtClean="0"/>
+              <a:rPr lang="fr-FR"/>
               <a:t>Quatrième niveau</a:t>
             </a:r>
           </a:p>
           <a:p>
             <a:pPr lvl="4"/>
             <a:r>
-              <a:rPr lang="fr-FR" smtClean="0"/>
+              <a:rPr lang="fr-FR"/>
               <a:t>Cinquième niveau</a:t>
             </a:r>
             <a:endParaRPr lang="en-US" dirty="0"/>
@@ -9258,7 +9258,7 @@
           <a:p>
             <a:fld id="{5FDD63B2-E120-4ED8-B27B-C685F510A5FE}" type="datetimeFigureOut">
               <a:rPr lang="en-US" dirty="0"/>
-              <a:t>11/25/2022</a:t>
+              <a:t>11/26/2022</a:t>
             </a:fld>
             <a:endParaRPr lang="en-US" dirty="0"/>
           </a:p>
@@ -9301,7 +9301,7 @@
             <a:fld id="{D57F1E4F-1CFF-5643-939E-217C01CDF565}" type="slidenum">
               <a:rPr lang="en-US" dirty="0"/>
               <a:pPr/>
-              <a:t>‹N°›</a:t>
+              <a:t>‹#›</a:t>
             </a:fld>
             <a:endParaRPr lang="en-US" dirty="0"/>
           </a:p>
@@ -9357,7 +9357,7 @@
           </a:lstStyle>
           <a:p>
             <a:r>
-              <a:rPr lang="fr-FR" smtClean="0"/>
+              <a:rPr lang="fr-FR"/>
               <a:t>Modifiez le style du titre</a:t>
             </a:r>
             <a:endParaRPr lang="en-US" dirty="0"/>
@@ -9381,7 +9381,7 @@
           <a:p>
             <a:fld id="{7AA18ACC-A947-437B-A130-35BD54FDF1E9}" type="datetimeFigureOut">
               <a:rPr lang="en-US" dirty="0"/>
-              <a:t>11/25/2022</a:t>
+              <a:t>11/26/2022</a:t>
             </a:fld>
             <a:endParaRPr lang="en-US" dirty="0"/>
           </a:p>
@@ -9424,7 +9424,7 @@
             <a:fld id="{D57F1E4F-1CFF-5643-939E-217C01CDF565}" type="slidenum">
               <a:rPr lang="en-US" dirty="0"/>
               <a:pPr/>
-              <a:t>‹N°›</a:t>
+              <a:t>‹#›</a:t>
             </a:fld>
             <a:endParaRPr lang="en-US" dirty="0"/>
           </a:p>
@@ -9472,7 +9472,7 @@
           <a:p>
             <a:fld id="{7C8D7E02-BCB8-4D50-A234-369438C08659}" type="datetimeFigureOut">
               <a:rPr lang="en-US" dirty="0"/>
-              <a:t>11/25/2022</a:t>
+              <a:t>11/26/2022</a:t>
             </a:fld>
             <a:endParaRPr lang="en-US" dirty="0"/>
           </a:p>
@@ -9551,7 +9551,7 @@
             <a:fld id="{D57F1E4F-1CFF-5643-939E-217C01CDF565}" type="slidenum">
               <a:rPr lang="en-US" dirty="0"/>
               <a:pPr/>
-              <a:t>‹N°›</a:t>
+              <a:t>‹#›</a:t>
             </a:fld>
             <a:endParaRPr lang="en-US" dirty="0"/>
           </a:p>
@@ -10394,7 +10394,7 @@
           </a:lstStyle>
           <a:p>
             <a:r>
-              <a:rPr lang="fr-FR" smtClean="0"/>
+              <a:rPr lang="fr-FR"/>
               <a:t>Modifiez le style du titre</a:t>
             </a:r>
             <a:endParaRPr lang="en-US" dirty="0"/>
@@ -10425,35 +10425,35 @@
           <a:p>
             <a:pPr lvl="0"/>
             <a:r>
-              <a:rPr lang="fr-FR" smtClean="0"/>
+              <a:rPr lang="fr-FR"/>
               <a:t>Modifier les styles du texte du masque</a:t>
             </a:r>
           </a:p>
           <a:p>
             <a:pPr lvl="1"/>
             <a:r>
-              <a:rPr lang="fr-FR" smtClean="0"/>
+              <a:rPr lang="fr-FR"/>
               <a:t>Deuxième niveau</a:t>
             </a:r>
           </a:p>
           <a:p>
             <a:pPr lvl="2"/>
             <a:r>
-              <a:rPr lang="fr-FR" smtClean="0"/>
+              <a:rPr lang="fr-FR"/>
               <a:t>Troisième niveau</a:t>
             </a:r>
           </a:p>
           <a:p>
             <a:pPr lvl="3"/>
             <a:r>
-              <a:rPr lang="fr-FR" smtClean="0"/>
+              <a:rPr lang="fr-FR"/>
               <a:t>Quatrième niveau</a:t>
             </a:r>
           </a:p>
           <a:p>
             <a:pPr lvl="4"/>
             <a:r>
-              <a:rPr lang="fr-FR" smtClean="0"/>
+              <a:rPr lang="fr-FR"/>
               <a:t>Cinquième niveau</a:t>
             </a:r>
             <a:endParaRPr lang="en-US" dirty="0"/>
@@ -10526,7 +10526,7 @@
           <a:p>
             <a:pPr lvl="0"/>
             <a:r>
-              <a:rPr lang="fr-FR" smtClean="0"/>
+              <a:rPr lang="fr-FR"/>
               <a:t>Modifier les styles du texte du masque</a:t>
             </a:r>
           </a:p>
@@ -10549,7 +10549,7 @@
           <a:p>
             <a:fld id="{76E86A4C-8E40-4F87-A4F0-01A0687C5742}" type="datetimeFigureOut">
               <a:rPr lang="en-US" dirty="0"/>
-              <a:t>11/25/2022</a:t>
+              <a:t>11/26/2022</a:t>
             </a:fld>
             <a:endParaRPr lang="en-US" dirty="0"/>
           </a:p>
@@ -10628,7 +10628,7 @@
             <a:fld id="{D57F1E4F-1CFF-5643-939E-217C01CDF565}" type="slidenum">
               <a:rPr lang="en-US" dirty="0"/>
               <a:pPr/>
-              <a:t>‹N°›</a:t>
+              <a:t>‹#›</a:t>
             </a:fld>
             <a:endParaRPr lang="en-US" dirty="0"/>
           </a:p>
@@ -11473,7 +11473,7 @@
           </a:lstStyle>
           <a:p>
             <a:r>
-              <a:rPr lang="fr-FR" smtClean="0"/>
+              <a:rPr lang="fr-FR"/>
               <a:t>Modifiez le style du titre</a:t>
             </a:r>
             <a:endParaRPr lang="en-US" dirty="0"/>
@@ -11555,7 +11555,7 @@
               <a:buNone/>
             </a:pPr>
             <a:r>
-              <a:rPr lang="fr-FR" smtClean="0"/>
+              <a:rPr lang="fr-FR"/>
               <a:t>Cliquez sur l'icône pour ajouter une image</a:t>
             </a:r>
             <a:endParaRPr lang="en-US" dirty="0"/>
@@ -11630,7 +11630,7 @@
           <a:p>
             <a:pPr lvl="0"/>
             <a:r>
-              <a:rPr lang="fr-FR" smtClean="0"/>
+              <a:rPr lang="fr-FR"/>
               <a:t>Modifier les styles du texte du masque</a:t>
             </a:r>
           </a:p>
@@ -11653,7 +11653,7 @@
           <a:p>
             <a:fld id="{35E72C73-2D91-4E12-BA25-F0AA0C03599B}" type="datetimeFigureOut">
               <a:rPr lang="en-US" dirty="0"/>
-              <a:t>11/25/2022</a:t>
+              <a:t>11/26/2022</a:t>
             </a:fld>
             <a:endParaRPr lang="en-US" dirty="0"/>
           </a:p>
@@ -11732,7 +11732,7 @@
             <a:fld id="{D57F1E4F-1CFF-5643-939E-217C01CDF565}" type="slidenum">
               <a:rPr lang="en-US" dirty="0"/>
               <a:pPr/>
-              <a:t>‹N°›</a:t>
+              <a:t>‹#›</a:t>
             </a:fld>
             <a:endParaRPr lang="en-US" dirty="0"/>
           </a:p>
@@ -12544,7 +12544,7 @@
           <a:lstStyle/>
           <a:p>
             <a:r>
-              <a:rPr lang="fr-FR" smtClean="0"/>
+              <a:rPr lang="fr-FR"/>
               <a:t>Modifiez le style du titre</a:t>
             </a:r>
             <a:endParaRPr lang="en-US" dirty="0"/>
@@ -12578,35 +12578,35 @@
           <a:p>
             <a:pPr lvl="0"/>
             <a:r>
-              <a:rPr lang="fr-FR" smtClean="0"/>
+              <a:rPr lang="fr-FR"/>
               <a:t>Modifier les styles du texte du masque</a:t>
             </a:r>
           </a:p>
           <a:p>
             <a:pPr lvl="1"/>
             <a:r>
-              <a:rPr lang="fr-FR" smtClean="0"/>
+              <a:rPr lang="fr-FR"/>
               <a:t>Deuxième niveau</a:t>
             </a:r>
           </a:p>
           <a:p>
             <a:pPr lvl="2"/>
             <a:r>
-              <a:rPr lang="fr-FR" smtClean="0"/>
+              <a:rPr lang="fr-FR"/>
               <a:t>Troisième niveau</a:t>
             </a:r>
           </a:p>
           <a:p>
             <a:pPr lvl="3"/>
             <a:r>
-              <a:rPr lang="fr-FR" smtClean="0"/>
+              <a:rPr lang="fr-FR"/>
               <a:t>Quatrième niveau</a:t>
             </a:r>
           </a:p>
           <a:p>
             <a:pPr lvl="4"/>
             <a:r>
-              <a:rPr lang="fr-FR" smtClean="0"/>
+              <a:rPr lang="fr-FR"/>
               <a:t>Cinquième niveau</a:t>
             </a:r>
             <a:endParaRPr lang="en-US" dirty="0"/>
@@ -12646,7 +12646,7 @@
           <a:p>
             <a:fld id="{2BE451C3-0FF4-47C4-B829-773ADF60F88C}" type="datetimeFigureOut">
               <a:rPr lang="en-US" dirty="0"/>
-              <a:t>11/25/2022</a:t>
+              <a:t>11/26/2022</a:t>
             </a:fld>
             <a:endParaRPr lang="en-US" dirty="0"/>
           </a:p>
@@ -12757,7 +12757,7 @@
             <a:fld id="{D57F1E4F-1CFF-5643-939E-217C01CDF565}" type="slidenum">
               <a:rPr lang="en-US" dirty="0"/>
               <a:pPr/>
-              <a:t>‹N°›</a:t>
+              <a:t>‹#›</a:t>
             </a:fld>
             <a:endParaRPr lang="en-US" dirty="0"/>
           </a:p>
@@ -13218,10 +13218,9 @@
           <a:lstStyle/>
           <a:p>
             <a:r>
-              <a:rPr lang="fr-FR" dirty="0" smtClean="0"/>
+              <a:rPr lang="fr-FR" dirty="0"/>
               <a:t>Problématique</a:t>
             </a:r>
-            <a:endParaRPr lang="fr-FR" dirty="0"/>
           </a:p>
         </p:txBody>
       </p:sp>
@@ -13241,21 +13240,21 @@
           <a:lstStyle/>
           <a:p>
             <a:r>
-              <a:rPr lang="fr-FR" dirty="0" smtClean="0"/>
+              <a:rPr lang="fr-FR" dirty="0"/>
               <a:t>Recommandation personnalisée d’un film dans un catalogue</a:t>
             </a:r>
           </a:p>
           <a:p>
             <a:pPr lvl="1"/>
             <a:r>
-              <a:rPr lang="fr-FR" dirty="0" smtClean="0"/>
+              <a:rPr lang="fr-FR" dirty="0"/>
               <a:t>Poser quelques questions pertinentes</a:t>
             </a:r>
           </a:p>
           <a:p>
             <a:pPr lvl="1"/>
             <a:r>
-              <a:rPr lang="fr-FR" dirty="0" smtClean="0"/>
+              <a:rPr lang="fr-FR" dirty="0"/>
               <a:t>Proposer le meilleur film</a:t>
             </a:r>
           </a:p>
@@ -13307,10 +13306,9 @@
           <a:lstStyle/>
           <a:p>
             <a:r>
-              <a:rPr lang="fr-FR" dirty="0" smtClean="0"/>
+              <a:rPr lang="fr-FR" dirty="0"/>
               <a:t>Démarche projet</a:t>
             </a:r>
-            <a:endParaRPr lang="fr-FR" dirty="0"/>
           </a:p>
         </p:txBody>
       </p:sp>
@@ -13332,86 +13330,66 @@
           <a:lstStyle/>
           <a:p>
             <a:r>
-              <a:rPr lang="fr-FR" dirty="0" smtClean="0"/>
-              <a:t>Utiliser </a:t>
-            </a:r>
-            <a:r>
               <a:rPr lang="fr-FR" dirty="0"/>
-              <a:t>les données </a:t>
-            </a:r>
-            <a:r>
-              <a:rPr lang="fr-FR" dirty="0" smtClean="0"/>
-              <a:t>: </a:t>
-            </a:r>
-            <a:r>
-              <a:rPr lang="fr-FR" dirty="0" smtClean="0">
-                <a:hlinkClick r:id="rId2"/>
-              </a:rPr>
-              <a:t>https</a:t>
+              <a:t>Utiliser les données : </a:t>
             </a:r>
             <a:r>
               <a:rPr lang="fr-FR" dirty="0">
                 <a:hlinkClick r:id="rId2"/>
               </a:rPr>
-              <a:t>://grouplens.org/datasets/movielens/latest</a:t>
+              <a:t>https://grouplens.org/datasets/movielens/latest/</a:t>
             </a:r>
+            <a:endParaRPr lang="fr-FR" dirty="0"/>
+          </a:p>
+          <a:p>
             <a:r>
-              <a:rPr lang="fr-FR" dirty="0" smtClean="0">
-                <a:hlinkClick r:id="rId2"/>
-              </a:rPr>
-              <a:t>/</a:t>
-            </a:r>
-            <a:endParaRPr lang="fr-FR" dirty="0" smtClean="0"/>
-          </a:p>
-          <a:p>
-            <a:r>
-              <a:rPr lang="fr-FR" dirty="0" smtClean="0"/>
+              <a:rPr lang="fr-FR" dirty="0"/>
               <a:t>Sélectionner les utilisateurs qui vu suffisamment de films</a:t>
             </a:r>
           </a:p>
           <a:p>
             <a:r>
-              <a:rPr lang="fr-FR" dirty="0" smtClean="0"/>
+              <a:rPr lang="fr-FR" dirty="0"/>
               <a:t>Sélectionner des films « représentatifs » </a:t>
             </a:r>
           </a:p>
           <a:p>
             <a:pPr lvl="1"/>
             <a:r>
-              <a:rPr lang="fr-FR" dirty="0" smtClean="0"/>
+              <a:rPr lang="fr-FR" dirty="0"/>
               <a:t>Vus par beaucoup</a:t>
             </a:r>
           </a:p>
           <a:p>
             <a:pPr lvl="1"/>
             <a:r>
-              <a:rPr lang="fr-FR" dirty="0" err="1" smtClean="0"/>
+              <a:rPr lang="fr-FR" dirty="0" err="1"/>
               <a:t>Clivants</a:t>
             </a:r>
-            <a:endParaRPr lang="fr-FR" dirty="0" smtClean="0"/>
+            <a:endParaRPr lang="fr-FR" dirty="0"/>
           </a:p>
           <a:p>
             <a:r>
-              <a:rPr lang="fr-FR" dirty="0" smtClean="0"/>
+              <a:rPr lang="fr-FR" dirty="0"/>
               <a:t>Sélectionner les films à mettre au catalogue</a:t>
             </a:r>
           </a:p>
           <a:p>
             <a:r>
-              <a:rPr lang="fr-FR" dirty="0" smtClean="0"/>
+              <a:rPr lang="fr-FR" dirty="0"/>
               <a:t>Sélectionner les caractéristiques utilisateurs</a:t>
             </a:r>
           </a:p>
           <a:p>
             <a:pPr lvl="1"/>
             <a:r>
-              <a:rPr lang="fr-FR" dirty="0" smtClean="0"/>
+              <a:rPr lang="fr-FR" dirty="0"/>
               <a:t>Repérer des catégories d’utilisateur et les décrire</a:t>
             </a:r>
           </a:p>
           <a:p>
             <a:r>
-              <a:rPr lang="fr-FR" dirty="0" smtClean="0"/>
+              <a:rPr lang="fr-FR" dirty="0"/>
               <a:t>Construire le jeu de données</a:t>
             </a:r>
           </a:p>
@@ -13419,7 +13397,7 @@
             <a:pPr marL="457200" lvl="1" indent="0">
               <a:buNone/>
             </a:pPr>
-            <a:endParaRPr lang="fr-FR" dirty="0" smtClean="0"/>
+            <a:endParaRPr lang="fr-FR" dirty="0"/>
           </a:p>
         </p:txBody>
       </p:sp>
@@ -13583,10 +13561,9 @@
                     <a:lstStyle/>
                     <a:p>
                       <a:r>
-                        <a:rPr lang="fr-FR" sz="1100" dirty="0" smtClean="0"/>
+                        <a:rPr lang="fr-FR" sz="1100" dirty="0"/>
                         <a:t>ID user</a:t>
                       </a:r>
-                      <a:endParaRPr lang="fr-FR" sz="1100" dirty="0"/>
                     </a:p>
                   </a:txBody>
                   <a:tcPr/>
@@ -13597,11 +13574,11 @@
                     <a:lstStyle/>
                     <a:p>
                       <a:r>
-                        <a:rPr lang="fr-FR" sz="1100" dirty="0" smtClean="0"/>
+                        <a:rPr lang="fr-FR" sz="1100" dirty="0"/>
                         <a:t>Genre</a:t>
                       </a:r>
                       <a:r>
-                        <a:rPr lang="fr-FR" sz="1100" baseline="0" dirty="0" smtClean="0"/>
+                        <a:rPr lang="fr-FR" sz="1100" baseline="0" dirty="0"/>
                         <a:t> préféré</a:t>
                       </a:r>
                       <a:endParaRPr lang="fr-FR" sz="1100" dirty="0"/>
@@ -13621,10 +13598,9 @@
                     <a:lstStyle/>
                     <a:p>
                       <a:r>
-                        <a:rPr lang="fr-FR" sz="1100" dirty="0" smtClean="0"/>
+                        <a:rPr lang="fr-FR" sz="1100" dirty="0"/>
                         <a:t>Film plus ancien</a:t>
                       </a:r>
-                      <a:endParaRPr lang="fr-FR" sz="1100" dirty="0"/>
                     </a:p>
                   </a:txBody>
                   <a:tcPr>
@@ -13641,10 +13617,9 @@
                     <a:lstStyle/>
                     <a:p>
                       <a:r>
-                        <a:rPr lang="fr-FR" sz="1100" dirty="0" smtClean="0"/>
+                        <a:rPr lang="fr-FR" sz="1100" dirty="0"/>
                         <a:t>Réalisateur préféré</a:t>
                       </a:r>
-                      <a:endParaRPr lang="fr-FR" sz="1100" dirty="0"/>
                     </a:p>
                   </a:txBody>
                   <a:tcPr>
@@ -13661,14 +13636,13 @@
                     <a:lstStyle/>
                     <a:p>
                       <a:r>
-                        <a:rPr lang="fr-FR" sz="1100" dirty="0" err="1" smtClean="0"/>
+                        <a:rPr lang="fr-FR" sz="1100" dirty="0" err="1"/>
                         <a:t>Nbre</a:t>
                       </a:r>
                       <a:r>
-                        <a:rPr lang="fr-FR" sz="1100" dirty="0" smtClean="0"/>
+                        <a:rPr lang="fr-FR" sz="1100" dirty="0"/>
                         <a:t> de film vu / an</a:t>
                       </a:r>
-                      <a:endParaRPr lang="fr-FR" sz="1100" dirty="0"/>
                     </a:p>
                   </a:txBody>
                   <a:tcPr>
@@ -13685,10 +13659,9 @@
                     <a:lstStyle/>
                     <a:p>
                       <a:r>
-                        <a:rPr lang="fr-FR" sz="1100" dirty="0" smtClean="0"/>
+                        <a:rPr lang="fr-FR" sz="1100" dirty="0"/>
                         <a:t>Les visiteurs</a:t>
                       </a:r>
-                      <a:endParaRPr lang="fr-FR" sz="1100" dirty="0"/>
                     </a:p>
                   </a:txBody>
                   <a:tcPr>
@@ -13703,10 +13676,9 @@
                     <a:lstStyle/>
                     <a:p>
                       <a:r>
-                        <a:rPr lang="fr-FR" sz="1100" dirty="0" smtClean="0"/>
+                        <a:rPr lang="fr-FR" sz="1100" dirty="0"/>
                         <a:t>Armageddon</a:t>
                       </a:r>
-                      <a:endParaRPr lang="fr-FR" sz="1100" dirty="0"/>
                     </a:p>
                   </a:txBody>
                   <a:tcPr>
@@ -13721,10 +13693,9 @@
                     <a:lstStyle/>
                     <a:p>
                       <a:r>
-                        <a:rPr lang="fr-FR" sz="1100" dirty="0" smtClean="0"/>
+                        <a:rPr lang="fr-FR" sz="1100" dirty="0"/>
                         <a:t>Harry Potter</a:t>
                       </a:r>
-                      <a:endParaRPr lang="fr-FR" sz="1100" dirty="0"/>
                     </a:p>
                   </a:txBody>
                   <a:tcPr>
@@ -13739,11 +13710,11 @@
                     <a:lstStyle/>
                     <a:p>
                       <a:r>
-                        <a:rPr lang="fr-FR" sz="1100" dirty="0" smtClean="0"/>
+                        <a:rPr lang="fr-FR" sz="1100" dirty="0"/>
                         <a:t>Film</a:t>
                       </a:r>
                       <a:r>
-                        <a:rPr lang="fr-FR" sz="1100" baseline="0" dirty="0" smtClean="0"/>
+                        <a:rPr lang="fr-FR" sz="1100" baseline="0" dirty="0"/>
                         <a:t> au catalogue 1</a:t>
                       </a:r>
                       <a:endParaRPr lang="fr-FR" sz="1100" dirty="0"/>
@@ -13778,14 +13749,14 @@
                         <a:defRPr/>
                       </a:pPr>
                       <a:r>
-                        <a:rPr lang="fr-FR" sz="1100" dirty="0" smtClean="0"/>
+                        <a:rPr lang="fr-FR" sz="1100" dirty="0"/>
                         <a:t>Film</a:t>
                       </a:r>
                       <a:r>
-                        <a:rPr lang="fr-FR" sz="1100" baseline="0" dirty="0" smtClean="0"/>
+                        <a:rPr lang="fr-FR" sz="1100" baseline="0" dirty="0"/>
                         <a:t> au catalogue 2</a:t>
                       </a:r>
-                      <a:endParaRPr lang="fr-FR" sz="1100" dirty="0" smtClean="0"/>
+                      <a:endParaRPr lang="fr-FR" sz="1100" dirty="0"/>
                     </a:p>
                     <a:p>
                       <a:endParaRPr lang="fr-FR" sz="1100" dirty="0"/>
@@ -13820,14 +13791,14 @@
                         <a:defRPr/>
                       </a:pPr>
                       <a:r>
-                        <a:rPr lang="fr-FR" sz="1100" dirty="0" smtClean="0"/>
+                        <a:rPr lang="fr-FR" sz="1100" dirty="0"/>
                         <a:t>Film</a:t>
                       </a:r>
                       <a:r>
-                        <a:rPr lang="fr-FR" sz="1100" baseline="0" dirty="0" smtClean="0"/>
+                        <a:rPr lang="fr-FR" sz="1100" baseline="0" dirty="0"/>
                         <a:t> au catalogue 3</a:t>
                       </a:r>
-                      <a:endParaRPr lang="fr-FR" sz="1100" dirty="0" smtClean="0"/>
+                      <a:endParaRPr lang="fr-FR" sz="1100" dirty="0"/>
                     </a:p>
                     <a:p>
                       <a:endParaRPr lang="fr-FR" sz="1100" dirty="0"/>
@@ -13852,10 +13823,9 @@
                     <a:lstStyle/>
                     <a:p>
                       <a:r>
-                        <a:rPr lang="fr-FR" sz="1100" dirty="0" smtClean="0"/>
+                        <a:rPr lang="fr-FR" sz="1100" dirty="0"/>
                         <a:t>1</a:t>
                       </a:r>
-                      <a:endParaRPr lang="fr-FR" sz="1100" dirty="0"/>
                     </a:p>
                   </a:txBody>
                   <a:tcPr>
@@ -13872,10 +13842,9 @@
                     <a:lstStyle/>
                     <a:p>
                       <a:r>
-                        <a:rPr lang="fr-FR" sz="1100" dirty="0" smtClean="0"/>
+                        <a:rPr lang="fr-FR" sz="1100" dirty="0"/>
                         <a:t>comédie</a:t>
                       </a:r>
-                      <a:endParaRPr lang="fr-FR" sz="1100" dirty="0"/>
                     </a:p>
                   </a:txBody>
                   <a:tcPr>
@@ -13892,10 +13861,9 @@
                     <a:lstStyle/>
                     <a:p>
                       <a:r>
-                        <a:rPr lang="fr-FR" sz="1100" dirty="0" smtClean="0"/>
+                        <a:rPr lang="fr-FR" sz="1100" dirty="0"/>
                         <a:t>1975</a:t>
                       </a:r>
-                      <a:endParaRPr lang="fr-FR" sz="1100" dirty="0"/>
                     </a:p>
                   </a:txBody>
                   <a:tcPr>
@@ -13912,10 +13880,9 @@
                     <a:lstStyle/>
                     <a:p>
                       <a:r>
-                        <a:rPr lang="fr-FR" sz="1100" dirty="0" smtClean="0"/>
+                        <a:rPr lang="fr-FR" sz="1100" dirty="0"/>
                         <a:t>Lynch</a:t>
                       </a:r>
-                      <a:endParaRPr lang="fr-FR" sz="1100" dirty="0"/>
                     </a:p>
                   </a:txBody>
                   <a:tcPr>
@@ -13932,10 +13899,9 @@
                     <a:lstStyle/>
                     <a:p>
                       <a:r>
-                        <a:rPr lang="fr-FR" sz="1100" dirty="0" smtClean="0"/>
+                        <a:rPr lang="fr-FR" sz="1100" dirty="0"/>
                         <a:t>6</a:t>
                       </a:r>
-                      <a:endParaRPr lang="fr-FR" sz="1100" dirty="0"/>
                     </a:p>
                   </a:txBody>
                   <a:tcPr>
@@ -13952,10 +13918,9 @@
                     <a:lstStyle/>
                     <a:p>
                       <a:r>
-                        <a:rPr lang="fr-FR" sz="1100" dirty="0" smtClean="0"/>
+                        <a:rPr lang="fr-FR" sz="1100" dirty="0"/>
                         <a:t>1</a:t>
                       </a:r>
-                      <a:endParaRPr lang="fr-FR" sz="1100" dirty="0"/>
                     </a:p>
                   </a:txBody>
                   <a:tcPr>
@@ -13970,10 +13935,9 @@
                     <a:lstStyle/>
                     <a:p>
                       <a:r>
-                        <a:rPr lang="fr-FR" sz="1100" dirty="0" smtClean="0"/>
+                        <a:rPr lang="fr-FR" sz="1100" dirty="0"/>
                         <a:t>5</a:t>
                       </a:r>
-                      <a:endParaRPr lang="fr-FR" sz="1100" dirty="0"/>
                     </a:p>
                   </a:txBody>
                   <a:tcPr>
@@ -13988,10 +13952,9 @@
                     <a:lstStyle/>
                     <a:p>
                       <a:r>
-                        <a:rPr lang="fr-FR" sz="1100" dirty="0" smtClean="0"/>
+                        <a:rPr lang="fr-FR" sz="1100" dirty="0"/>
                         <a:t>3</a:t>
                       </a:r>
-                      <a:endParaRPr lang="fr-FR" sz="1100" dirty="0"/>
                     </a:p>
                   </a:txBody>
                   <a:tcPr>
@@ -14006,10 +13969,9 @@
                     <a:lstStyle/>
                     <a:p>
                       <a:r>
-                        <a:rPr lang="fr-FR" sz="1100" dirty="0" smtClean="0"/>
+                        <a:rPr lang="fr-FR" sz="1100" dirty="0"/>
                         <a:t>4,5</a:t>
                       </a:r>
-                      <a:endParaRPr lang="fr-FR" sz="1100" dirty="0"/>
                     </a:p>
                   </a:txBody>
                   <a:tcPr>
@@ -14059,10 +14021,9 @@
                     <a:lstStyle/>
                     <a:p>
                       <a:r>
-                        <a:rPr lang="fr-FR" sz="1100" dirty="0" smtClean="0"/>
+                        <a:rPr lang="fr-FR" sz="1100" dirty="0"/>
                         <a:t>2</a:t>
                       </a:r>
-                      <a:endParaRPr lang="fr-FR" sz="1100" dirty="0"/>
                     </a:p>
                   </a:txBody>
                   <a:tcPr>
@@ -14234,10 +14195,9 @@
                     <a:lstStyle/>
                     <a:p>
                       <a:r>
-                        <a:rPr lang="fr-FR" sz="1100" dirty="0" smtClean="0"/>
+                        <a:rPr lang="fr-FR" sz="1100" dirty="0"/>
                         <a:t>,,,</a:t>
                       </a:r>
-                      <a:endParaRPr lang="fr-FR" sz="1100" dirty="0"/>
                     </a:p>
                   </a:txBody>
                   <a:tcPr>
@@ -14922,10 +14882,9 @@
                     <a:lstStyle/>
                     <a:p>
                       <a:r>
-                        <a:rPr lang="fr-FR" sz="1100" dirty="0" smtClean="0"/>
+                        <a:rPr lang="fr-FR" sz="1100" dirty="0"/>
                         <a:t>Examinateur</a:t>
                       </a:r>
-                      <a:endParaRPr lang="fr-FR" sz="1100" dirty="0"/>
                     </a:p>
                   </a:txBody>
                   <a:tcPr/>
@@ -14936,10 +14895,9 @@
                     <a:lstStyle/>
                     <a:p>
                       <a:r>
-                        <a:rPr lang="fr-FR" sz="1100" dirty="0" smtClean="0"/>
+                        <a:rPr lang="fr-FR" sz="1100" dirty="0"/>
                         <a:t>?</a:t>
                       </a:r>
-                      <a:endParaRPr lang="fr-FR" sz="1100" dirty="0"/>
                     </a:p>
                   </a:txBody>
                   <a:tcPr>
@@ -14956,10 +14914,9 @@
                     <a:lstStyle/>
                     <a:p>
                       <a:r>
-                        <a:rPr lang="fr-FR" sz="1100" dirty="0" smtClean="0"/>
+                        <a:rPr lang="fr-FR" sz="1100" dirty="0"/>
                         <a:t>?</a:t>
                       </a:r>
-                      <a:endParaRPr lang="fr-FR" sz="1100" dirty="0"/>
                     </a:p>
                   </a:txBody>
                   <a:tcPr>
@@ -14976,10 +14933,9 @@
                     <a:lstStyle/>
                     <a:p>
                       <a:r>
-                        <a:rPr lang="fr-FR" sz="1100" dirty="0" smtClean="0"/>
+                        <a:rPr lang="fr-FR" sz="1100" dirty="0"/>
                         <a:t>?</a:t>
                       </a:r>
-                      <a:endParaRPr lang="fr-FR" sz="1100" dirty="0"/>
                     </a:p>
                   </a:txBody>
                   <a:tcPr>
@@ -14996,10 +14952,9 @@
                     <a:lstStyle/>
                     <a:p>
                       <a:r>
-                        <a:rPr lang="fr-FR" sz="1100" dirty="0" smtClean="0"/>
+                        <a:rPr lang="fr-FR" sz="1100" dirty="0"/>
                         <a:t>?</a:t>
                       </a:r>
-                      <a:endParaRPr lang="fr-FR" sz="1100" dirty="0"/>
                     </a:p>
                   </a:txBody>
                   <a:tcPr>
@@ -15016,10 +14971,9 @@
                     <a:lstStyle/>
                     <a:p>
                       <a:r>
-                        <a:rPr lang="fr-FR" sz="1100" dirty="0" smtClean="0"/>
+                        <a:rPr lang="fr-FR" sz="1100" dirty="0"/>
                         <a:t>?</a:t>
                       </a:r>
-                      <a:endParaRPr lang="fr-FR" sz="1100" dirty="0"/>
                     </a:p>
                   </a:txBody>
                   <a:tcPr>
@@ -15036,10 +14990,9 @@
                     <a:lstStyle/>
                     <a:p>
                       <a:r>
-                        <a:rPr lang="fr-FR" sz="1100" dirty="0" smtClean="0"/>
+                        <a:rPr lang="fr-FR" sz="1100" dirty="0"/>
                         <a:t>?</a:t>
                       </a:r>
-                      <a:endParaRPr lang="fr-FR" sz="1100" dirty="0"/>
                     </a:p>
                   </a:txBody>
                   <a:tcPr>
@@ -15056,10 +15009,9 @@
                     <a:lstStyle/>
                     <a:p>
                       <a:r>
-                        <a:rPr lang="fr-FR" sz="1100" dirty="0" smtClean="0"/>
+                        <a:rPr lang="fr-FR" sz="1100" dirty="0"/>
                         <a:t>?</a:t>
                       </a:r>
-                      <a:endParaRPr lang="fr-FR" sz="1100" dirty="0"/>
                     </a:p>
                   </a:txBody>
                   <a:tcPr>
@@ -15076,10 +15028,9 @@
                     <a:lstStyle/>
                     <a:p>
                       <a:r>
-                        <a:rPr lang="fr-FR" sz="1100" dirty="0" smtClean="0"/>
+                        <a:rPr lang="fr-FR" sz="1100" dirty="0"/>
                         <a:t>à prévoir</a:t>
                       </a:r>
-                      <a:endParaRPr lang="fr-FR" sz="1100" dirty="0"/>
                     </a:p>
                   </a:txBody>
                   <a:tcPr>
@@ -15111,7 +15062,7 @@
                         <a:defRPr/>
                       </a:pPr>
                       <a:r>
-                        <a:rPr lang="fr-FR" sz="1100" dirty="0" smtClean="0"/>
+                        <a:rPr lang="fr-FR" sz="1100" dirty="0"/>
                         <a:t>à prévoir</a:t>
                       </a:r>
                     </a:p>
@@ -15148,7 +15099,7 @@
                         <a:defRPr/>
                       </a:pPr>
                       <a:r>
-                        <a:rPr lang="fr-FR" sz="1100" dirty="0" smtClean="0"/>
+                        <a:rPr lang="fr-FR" sz="1100" dirty="0"/>
                         <a:t>à prévoir</a:t>
                       </a:r>
                     </a:p>
@@ -15236,10 +15187,9 @@
           <a:lstStyle/>
           <a:p>
             <a:r>
-              <a:rPr lang="fr-FR" dirty="0" smtClean="0"/>
+              <a:rPr lang="fr-FR" dirty="0"/>
               <a:t>Résultat = film avec la meilleure note</a:t>
             </a:r>
-            <a:endParaRPr lang="fr-FR" dirty="0"/>
           </a:p>
         </p:txBody>
       </p:sp>

</xml_diff>